<commit_message>
[no-issue] Added missing slide with platform and technologies, reexprtoed .pdf file
</commit_message>
<xml_diff>
--- a/presentations/FJP-01.pptx
+++ b/presentations/FJP-01.pptx
@@ -5,10 +5,10 @@
     <p:sldMasterId id="2147483683" r:id="rId1"/>
   </p:sldMasterIdLst>
   <p:notesMasterIdLst>
-    <p:notesMasterId r:id="rId19"/>
+    <p:notesMasterId r:id="rId20"/>
   </p:notesMasterIdLst>
   <p:handoutMasterIdLst>
-    <p:handoutMasterId r:id="rId20"/>
+    <p:handoutMasterId r:id="rId21"/>
   </p:handoutMasterIdLst>
   <p:sldIdLst>
     <p:sldId id="256" r:id="rId2"/>
@@ -25,31 +25,32 @@
     <p:sldId id="322" r:id="rId13"/>
     <p:sldId id="316" r:id="rId14"/>
     <p:sldId id="323" r:id="rId15"/>
-    <p:sldId id="317" r:id="rId16"/>
-    <p:sldId id="318" r:id="rId17"/>
-    <p:sldId id="319" r:id="rId18"/>
+    <p:sldId id="324" r:id="rId16"/>
+    <p:sldId id="317" r:id="rId17"/>
+    <p:sldId id="318" r:id="rId18"/>
+    <p:sldId id="319" r:id="rId19"/>
   </p:sldIdLst>
   <p:sldSz cx="9144000" cy="5143500" type="screen16x9"/>
   <p:notesSz cx="6858000" cy="9144000"/>
   <p:embeddedFontLst>
     <p:embeddedFont>
       <p:font typeface="Montserrat" panose="00000500000000000000" pitchFamily="2" charset="-18"/>
-      <p:regular r:id="rId21"/>
-      <p:bold r:id="rId22"/>
-      <p:italic r:id="rId23"/>
-      <p:boldItalic r:id="rId24"/>
+      <p:regular r:id="rId22"/>
+      <p:bold r:id="rId23"/>
+      <p:italic r:id="rId24"/>
+      <p:boldItalic r:id="rId25"/>
     </p:embeddedFont>
     <p:embeddedFont>
       <p:font typeface="Montserrat ExtraBold" panose="00000900000000000000" pitchFamily="2" charset="-18"/>
-      <p:bold r:id="rId25"/>
-      <p:boldItalic r:id="rId26"/>
+      <p:bold r:id="rId26"/>
+      <p:boldItalic r:id="rId27"/>
     </p:embeddedFont>
     <p:embeddedFont>
       <p:font typeface="Montserrat ExtraLight" panose="00000300000000000000" pitchFamily="2" charset="-18"/>
-      <p:regular r:id="rId27"/>
-      <p:bold r:id="rId28"/>
-      <p:italic r:id="rId29"/>
-      <p:boldItalic r:id="rId30"/>
+      <p:regular r:id="rId28"/>
+      <p:bold r:id="rId29"/>
+      <p:italic r:id="rId30"/>
+      <p:boldItalic r:id="rId31"/>
     </p:embeddedFont>
   </p:embeddedFontLst>
   <p:defaultTextStyle>
@@ -6567,7 +6568,7 @@
           <p:cNvPr id="2" name="Nadpis 1">
             <a:extLst>
               <a:ext uri="{FF2B5EF4-FFF2-40B4-BE49-F238E27FC236}">
-                <a16:creationId xmlns:a16="http://schemas.microsoft.com/office/drawing/2014/main" id="{CFE7FB2D-9A34-F0CE-38ED-C8E7D4DFB5BB}"/>
+                <a16:creationId xmlns:a16="http://schemas.microsoft.com/office/drawing/2014/main" id="{7CA4489F-7997-CB0A-3A13-456547C5A17A}"/>
               </a:ext>
             </a:extLst>
           </p:cNvPr>
@@ -6575,7 +6576,7 @@
             <a:spLocks noGrp="1"/>
           </p:cNvSpPr>
           <p:nvPr>
-            <p:ph type="ctrTitle"/>
+            <p:ph type="title"/>
           </p:nvPr>
         </p:nvSpPr>
         <p:spPr/>
@@ -6585,7 +6586,126 @@
           <a:p>
             <a:r>
               <a:rPr lang="cs-CZ" dirty="0"/>
-              <a:t>Děkujeme za pozornost</a:t>
+              <a:t>Technologie + cílová</a:t>
+            </a:r>
+            <a:br>
+              <a:rPr lang="cs-CZ" dirty="0"/>
+            </a:br>
+            <a:r>
+              <a:rPr lang="cs-CZ" dirty="0"/>
+              <a:t>platforma</a:t>
+            </a:r>
+          </a:p>
+        </p:txBody>
+      </p:sp>
+      <p:sp>
+        <p:nvSpPr>
+          <p:cNvPr id="3" name="Zástupný text 2">
+            <a:extLst>
+              <a:ext uri="{FF2B5EF4-FFF2-40B4-BE49-F238E27FC236}">
+                <a16:creationId xmlns:a16="http://schemas.microsoft.com/office/drawing/2014/main" id="{1B2E4562-86D2-177E-F967-3BB185DFE085}"/>
+              </a:ext>
+            </a:extLst>
+          </p:cNvPr>
+          <p:cNvSpPr>
+            <a:spLocks noGrp="1"/>
+          </p:cNvSpPr>
+          <p:nvPr>
+            <p:ph type="body" idx="1"/>
+          </p:nvPr>
+        </p:nvSpPr>
+        <p:spPr>
+          <a:xfrm>
+            <a:off x="938500" y="1581293"/>
+            <a:ext cx="7172100" cy="2704632"/>
+          </a:xfrm>
+        </p:spPr>
+        <p:txBody>
+          <a:bodyPr/>
+          <a:lstStyle/>
+          <a:p>
+            <a:r>
+              <a:rPr lang="cs-CZ" sz="1400" dirty="0"/>
+              <a:t>Technologie</a:t>
+            </a:r>
+          </a:p>
+          <a:p>
+            <a:pPr lvl="1"/>
+            <a:r>
+              <a:rPr lang="cs-CZ" sz="1400" dirty="0" err="1"/>
+              <a:t>flex</a:t>
+            </a:r>
+            <a:endParaRPr lang="cs-CZ" sz="1400" dirty="0"/>
+          </a:p>
+          <a:p>
+            <a:pPr lvl="1"/>
+            <a:r>
+              <a:rPr lang="cs-CZ" sz="1400" dirty="0" err="1"/>
+              <a:t>yacc</a:t>
+            </a:r>
+            <a:endParaRPr lang="cs-CZ" sz="1400" dirty="0"/>
+          </a:p>
+          <a:p>
+            <a:pPr marL="612775" lvl="1" indent="0">
+              <a:buNone/>
+            </a:pPr>
+            <a:endParaRPr lang="cs-CZ" sz="1400" dirty="0"/>
+          </a:p>
+          <a:p>
+            <a:r>
+              <a:rPr lang="cs-CZ" sz="1400" dirty="0"/>
+              <a:t>Cílová platforma</a:t>
+            </a:r>
+          </a:p>
+          <a:p>
+            <a:pPr lvl="1"/>
+            <a:r>
+              <a:rPr lang="cs-CZ" sz="1400" dirty="0"/>
+              <a:t>PL/0</a:t>
+            </a:r>
+          </a:p>
+          <a:p>
+            <a:pPr lvl="2"/>
+            <a:endParaRPr lang="cs-CZ" sz="1400" dirty="0"/>
+          </a:p>
+        </p:txBody>
+      </p:sp>
+      <p:sp>
+        <p:nvSpPr>
+          <p:cNvPr id="4" name="TextovéPole 3">
+            <a:extLst>
+              <a:ext uri="{FF2B5EF4-FFF2-40B4-BE49-F238E27FC236}">
+                <a16:creationId xmlns:a16="http://schemas.microsoft.com/office/drawing/2014/main" id="{3F02A21D-1EB2-35A4-AC1E-AFAF5E10FF66}"/>
+              </a:ext>
+            </a:extLst>
+          </p:cNvPr>
+          <p:cNvSpPr txBox="1"/>
+          <p:nvPr/>
+        </p:nvSpPr>
+        <p:spPr>
+          <a:xfrm>
+            <a:off x="0" y="4754902"/>
+            <a:ext cx="9144000" cy="307777"/>
+          </a:xfrm>
+          <a:prstGeom prst="rect">
+            <a:avLst/>
+          </a:prstGeom>
+          <a:noFill/>
+        </p:spPr>
+        <p:txBody>
+          <a:bodyPr wrap="square" rtlCol="0">
+            <a:spAutoFit/>
+          </a:bodyPr>
+          <a:lstStyle/>
+          <a:p>
+            <a:pPr algn="ctr"/>
+            <a:r>
+              <a:rPr lang="cs-CZ" dirty="0">
+                <a:solidFill>
+                  <a:schemeClr val="bg1"/>
+                </a:solidFill>
+              </a:rPr>
+              <a:t>15</a:t>
             </a:r>
           </a:p>
         </p:txBody>
@@ -6593,7 +6713,7 @@
     </p:spTree>
     <p:extLst>
       <p:ext uri="{BB962C8B-B14F-4D97-AF65-F5344CB8AC3E}">
-        <p14:creationId xmlns:p14="http://schemas.microsoft.com/office/powerpoint/2010/main" val="3347724766"/>
+        <p14:creationId xmlns:p14="http://schemas.microsoft.com/office/powerpoint/2010/main" val="2497925388"/>
       </p:ext>
     </p:extLst>
   </p:cSld>
@@ -6636,6 +6756,64 @@
             <p:ph type="ctrTitle"/>
           </p:nvPr>
         </p:nvSpPr>
+        <p:spPr/>
+        <p:txBody>
+          <a:bodyPr/>
+          <a:lstStyle/>
+          <a:p>
+            <a:r>
+              <a:rPr lang="cs-CZ" dirty="0"/>
+              <a:t>Děkujeme za pozornost</a:t>
+            </a:r>
+          </a:p>
+        </p:txBody>
+      </p:sp>
+    </p:spTree>
+    <p:extLst>
+      <p:ext uri="{BB962C8B-B14F-4D97-AF65-F5344CB8AC3E}">
+        <p14:creationId xmlns:p14="http://schemas.microsoft.com/office/powerpoint/2010/main" val="3347724766"/>
+      </p:ext>
+    </p:extLst>
+  </p:cSld>
+  <p:clrMapOvr>
+    <a:masterClrMapping/>
+  </p:clrMapOvr>
+</p:sld>
+</file>
+
+<file path=ppt/slides/slide17.xml><?xml version="1.0" encoding="utf-8"?>
+<p:sld xmlns:a="http://schemas.openxmlformats.org/drawingml/2006/main" xmlns:r="http://schemas.openxmlformats.org/officeDocument/2006/relationships" xmlns:p="http://schemas.openxmlformats.org/presentationml/2006/main">
+  <p:cSld>
+    <p:spTree>
+      <p:nvGrpSpPr>
+        <p:cNvPr id="1" name=""/>
+        <p:cNvGrpSpPr/>
+        <p:nvPr/>
+      </p:nvGrpSpPr>
+      <p:grpSpPr>
+        <a:xfrm>
+          <a:off x="0" y="0"/>
+          <a:ext cx="0" cy="0"/>
+          <a:chOff x="0" y="0"/>
+          <a:chExt cx="0" cy="0"/>
+        </a:xfrm>
+      </p:grpSpPr>
+      <p:sp>
+        <p:nvSpPr>
+          <p:cNvPr id="2" name="Nadpis 1">
+            <a:extLst>
+              <a:ext uri="{FF2B5EF4-FFF2-40B4-BE49-F238E27FC236}">
+                <a16:creationId xmlns:a16="http://schemas.microsoft.com/office/drawing/2014/main" id="{CFE7FB2D-9A34-F0CE-38ED-C8E7D4DFB5BB}"/>
+              </a:ext>
+            </a:extLst>
+          </p:cNvPr>
+          <p:cNvSpPr>
+            <a:spLocks noGrp="1"/>
+          </p:cNvSpPr>
+          <p:nvPr>
+            <p:ph type="ctrTitle"/>
+          </p:nvPr>
+        </p:nvSpPr>
         <p:spPr>
           <a:xfrm>
             <a:off x="1273500" y="1931928"/>
@@ -6666,7 +6844,7 @@
 </p:sld>
 </file>
 
-<file path=ppt/slides/slide17.xml><?xml version="1.0" encoding="utf-8"?>
+<file path=ppt/slides/slide18.xml><?xml version="1.0" encoding="utf-8"?>
 <p:sld xmlns:a="http://schemas.openxmlformats.org/drawingml/2006/main" xmlns:r="http://schemas.openxmlformats.org/officeDocument/2006/relationships" xmlns:p="http://schemas.openxmlformats.org/presentationml/2006/main">
   <p:cSld>
     <p:spTree>
@@ -6779,7 +6957,7 @@
                   <a:schemeClr val="bg1"/>
                 </a:solidFill>
               </a:rPr>
-              <a:t>17</a:t>
+              <a:t>18</a:t>
             </a:r>
           </a:p>
         </p:txBody>

</xml_diff>